<commit_message>
add file lan 2
</commit_message>
<xml_diff>
--- a/SlideThuyetTrinh.pptx
+++ b/SlideThuyetTrinh.pptx
@@ -116,6 +116,11 @@
       </a:defRPr>
     </a:lvl9pPr>
   </p:defaultTextStyle>
+  <p:extLst>
+    <p:ext uri="{EFAFB233-063F-42B5-8137-9DF3F51BA10A}">
+      <p15:sldGuideLst xmlns:p15="http://schemas.microsoft.com/office/powerpoint/2012/main"/>
+    </p:ext>
+  </p:extLst>
 </p:presentation>
 </file>
 
@@ -270,7 +275,7 @@
           <a:p>
             <a:fld id="{32342A8F-7501-DF43-B346-58C651AE3918}" type="datetimeFigureOut">
               <a:rPr lang="en-US" smtClean="0"/>
-              <a:t>7/9/19</a:t>
+              <a:t>7/10/19</a:t>
             </a:fld>
             <a:endParaRPr lang="en-US"/>
           </a:p>
@@ -481,7 +486,7 @@
           <a:p>
             <a:fld id="{32342A8F-7501-DF43-B346-58C651AE3918}" type="datetimeFigureOut">
               <a:rPr lang="en-US" smtClean="0"/>
-              <a:t>7/9/19</a:t>
+              <a:t>7/10/19</a:t>
             </a:fld>
             <a:endParaRPr lang="en-US"/>
           </a:p>
@@ -696,7 +701,7 @@
           <a:p>
             <a:fld id="{32342A8F-7501-DF43-B346-58C651AE3918}" type="datetimeFigureOut">
               <a:rPr lang="en-US" smtClean="0"/>
-              <a:t>7/9/19</a:t>
+              <a:t>7/10/19</a:t>
             </a:fld>
             <a:endParaRPr lang="en-US"/>
           </a:p>
@@ -897,7 +902,7 @@
           <a:p>
             <a:fld id="{32342A8F-7501-DF43-B346-58C651AE3918}" type="datetimeFigureOut">
               <a:rPr lang="en-US" smtClean="0"/>
-              <a:t>7/9/19</a:t>
+              <a:t>7/10/19</a:t>
             </a:fld>
             <a:endParaRPr lang="en-US"/>
           </a:p>
@@ -1176,7 +1181,7 @@
           <a:p>
             <a:fld id="{32342A8F-7501-DF43-B346-58C651AE3918}" type="datetimeFigureOut">
               <a:rPr lang="en-US" smtClean="0"/>
-              <a:t>7/9/19</a:t>
+              <a:t>7/10/19</a:t>
             </a:fld>
             <a:endParaRPr lang="en-US"/>
           </a:p>
@@ -1444,7 +1449,7 @@
           <a:p>
             <a:fld id="{32342A8F-7501-DF43-B346-58C651AE3918}" type="datetimeFigureOut">
               <a:rPr lang="en-US" smtClean="0"/>
-              <a:t>7/9/19</a:t>
+              <a:t>7/10/19</a:t>
             </a:fld>
             <a:endParaRPr lang="en-US"/>
           </a:p>
@@ -1860,7 +1865,7 @@
           <a:p>
             <a:fld id="{32342A8F-7501-DF43-B346-58C651AE3918}" type="datetimeFigureOut">
               <a:rPr lang="en-US" smtClean="0"/>
-              <a:t>7/9/19</a:t>
+              <a:t>7/10/19</a:t>
             </a:fld>
             <a:endParaRPr lang="en-US"/>
           </a:p>
@@ -2009,7 +2014,7 @@
           <a:p>
             <a:fld id="{32342A8F-7501-DF43-B346-58C651AE3918}" type="datetimeFigureOut">
               <a:rPr lang="en-US" smtClean="0"/>
-              <a:t>7/9/19</a:t>
+              <a:t>7/10/19</a:t>
             </a:fld>
             <a:endParaRPr lang="en-US"/>
           </a:p>
@@ -2135,7 +2140,7 @@
           <a:p>
             <a:fld id="{32342A8F-7501-DF43-B346-58C651AE3918}" type="datetimeFigureOut">
               <a:rPr lang="en-US" smtClean="0"/>
-              <a:t>7/9/19</a:t>
+              <a:t>7/10/19</a:t>
             </a:fld>
             <a:endParaRPr lang="en-US"/>
           </a:p>
@@ -2386,7 +2391,7 @@
           <a:p>
             <a:fld id="{32342A8F-7501-DF43-B346-58C651AE3918}" type="datetimeFigureOut">
               <a:rPr lang="en-US" smtClean="0"/>
-              <a:t>7/9/19</a:t>
+              <a:t>7/10/19</a:t>
             </a:fld>
             <a:endParaRPr lang="en-US"/>
           </a:p>
@@ -2831,7 +2836,7 @@
           <a:p>
             <a:fld id="{32342A8F-7501-DF43-B346-58C651AE3918}" type="datetimeFigureOut">
               <a:rPr lang="en-US" smtClean="0"/>
-              <a:t>7/9/19</a:t>
+              <a:t>7/10/19</a:t>
             </a:fld>
             <a:endParaRPr lang="en-US"/>
           </a:p>
@@ -3157,7 +3162,7 @@
           <a:p>
             <a:fld id="{32342A8F-7501-DF43-B346-58C651AE3918}" type="datetimeFigureOut">
               <a:rPr lang="en-US" smtClean="0"/>
-              <a:t>7/9/19</a:t>
+              <a:t>7/10/19</a:t>
             </a:fld>
             <a:endParaRPr lang="en-US"/>
           </a:p>
@@ -6493,7 +6498,7 @@
         <p:spPr>
           <a:xfrm>
             <a:off x="1451579" y="2447364"/>
-            <a:ext cx="2824586" cy="461665"/>
+            <a:ext cx="2824586" cy="492443"/>
           </a:xfrm>
           <a:prstGeom prst="rect">
             <a:avLst/>
@@ -6507,7 +6512,7 @@
           <a:lstStyle/>
           <a:p>
             <a:r>
-              <a:rPr lang="en-US" sz="2400" b="1" dirty="0">
+              <a:rPr lang="en-US" sz="2600" b="1" dirty="0">
                 <a:solidFill>
                   <a:srgbClr val="FF0000"/>
                 </a:solidFill>
@@ -6635,7 +6640,7 @@
         <p:spPr>
           <a:xfrm>
             <a:off x="1451579" y="2122694"/>
-            <a:ext cx="2259809" cy="461665"/>
+            <a:ext cx="2259809" cy="492443"/>
           </a:xfrm>
           <a:prstGeom prst="rect">
             <a:avLst/>
@@ -6649,7 +6654,7 @@
           <a:lstStyle/>
           <a:p>
             <a:r>
-              <a:rPr lang="en-US" sz="2400" b="1" dirty="0">
+              <a:rPr lang="en-US" sz="2600" b="1" dirty="0">
                 <a:solidFill>
                   <a:srgbClr val="FF0000"/>
                 </a:solidFill>
@@ -6777,7 +6782,7 @@
         <p:spPr>
           <a:xfrm>
             <a:off x="1451579" y="2205315"/>
-            <a:ext cx="2448068" cy="461665"/>
+            <a:ext cx="2448068" cy="492443"/>
           </a:xfrm>
           <a:prstGeom prst="rect">
             <a:avLst/>
@@ -6791,7 +6796,7 @@
           <a:lstStyle/>
           <a:p>
             <a:r>
-              <a:rPr lang="en-US" sz="2400" b="1" dirty="0">
+              <a:rPr lang="en-US" sz="2600" b="1" dirty="0">
                 <a:solidFill>
                   <a:srgbClr val="FF0000"/>
                 </a:solidFill>
@@ -6801,7 +6806,7 @@
               <a:t>3. </a:t>
             </a:r>
             <a:r>
-              <a:rPr lang="en-US" sz="2400" b="1" dirty="0" err="1">
+              <a:rPr lang="en-US" sz="2600" b="1" dirty="0" err="1">
                 <a:solidFill>
                   <a:srgbClr val="FF0000"/>
                 </a:solidFill>
@@ -6810,7 +6815,7 @@
               </a:rPr>
               <a:t>ClingMe</a:t>
             </a:r>
-            <a:endParaRPr lang="en-US" sz="2400" b="1" dirty="0">
+            <a:endParaRPr lang="en-US" sz="2600" b="1" dirty="0">
               <a:solidFill>
                 <a:srgbClr val="FF0000"/>
               </a:solidFill>
@@ -6897,7 +6902,7 @@
         <p:spPr>
           <a:xfrm>
             <a:off x="1451579" y="2366683"/>
-            <a:ext cx="2449710" cy="461665"/>
+            <a:ext cx="3692421" cy="492443"/>
           </a:xfrm>
           <a:prstGeom prst="rect">
             <a:avLst/>
@@ -6911,24 +6916,24 @@
           <a:lstStyle/>
           <a:p>
             <a:r>
-              <a:rPr lang="en-US" sz="2400" b="1" dirty="0">
+              <a:rPr lang="en-US" sz="2600" b="1" dirty="0">
                 <a:solidFill>
                   <a:srgbClr val="FF0000"/>
                 </a:solidFill>
                 <a:latin typeface="Times New Roman" panose="02020603050405020304" pitchFamily="18" charset="0"/>
                 <a:cs typeface="Times New Roman" panose="02020603050405020304" pitchFamily="18" charset="0"/>
               </a:rPr>
-              <a:t>BẢNG DỮ LIỆU</a:t>
+              <a:t>USE CASE HỆ THỐNG</a:t>
             </a:r>
           </a:p>
         </p:txBody>
       </p:sp>
       <p:pic>
         <p:nvPicPr>
-          <p:cNvPr id="5" name="Picture 4">
+          <p:cNvPr id="6" name="Picture 5">
             <a:extLst>
               <a:ext uri="{FF2B5EF4-FFF2-40B4-BE49-F238E27FC236}">
-                <a16:creationId xmlns:a16="http://schemas.microsoft.com/office/drawing/2014/main" id="{E0A23C19-C6EF-C74F-AEAE-3C47E318CAAF}"/>
+                <a16:creationId xmlns:a16="http://schemas.microsoft.com/office/drawing/2014/main" id="{73D36004-7AAA-FD40-9653-059715BEB1EF}"/>
               </a:ext>
             </a:extLst>
           </p:cNvPr>
@@ -6949,8 +6954,8 @@
         </p:blipFill>
         <p:spPr>
           <a:xfrm>
-            <a:off x="4464423" y="2366683"/>
-            <a:ext cx="5862917" cy="3272306"/>
+            <a:off x="5347854" y="2213385"/>
+            <a:ext cx="5332005" cy="3291840"/>
           </a:xfrm>
           <a:prstGeom prst="rect">
             <a:avLst/>
@@ -7019,12 +7024,53 @@
           </a:p>
         </p:txBody>
       </p:sp>
+      <p:sp>
+        <p:nvSpPr>
+          <p:cNvPr id="6" name="TextBox 5">
+            <a:extLst>
+              <a:ext uri="{FF2B5EF4-FFF2-40B4-BE49-F238E27FC236}">
+                <a16:creationId xmlns:a16="http://schemas.microsoft.com/office/drawing/2014/main" id="{27F84563-3F7C-6544-AEC1-5E08B22AE059}"/>
+              </a:ext>
+            </a:extLst>
+          </p:cNvPr>
+          <p:cNvSpPr txBox="1"/>
+          <p:nvPr/>
+        </p:nvSpPr>
+        <p:spPr>
+          <a:xfrm>
+            <a:off x="1451578" y="2213385"/>
+            <a:ext cx="3685197" cy="461665"/>
+          </a:xfrm>
+          <a:prstGeom prst="rect">
+            <a:avLst/>
+          </a:prstGeom>
+          <a:noFill/>
+        </p:spPr>
+        <p:txBody>
+          <a:bodyPr wrap="square" rtlCol="0">
+            <a:spAutoFit/>
+          </a:bodyPr>
+          <a:lstStyle/>
+          <a:p>
+            <a:r>
+              <a:rPr lang="en-US" sz="2400" b="1" dirty="0">
+                <a:solidFill>
+                  <a:srgbClr val="FF0000"/>
+                </a:solidFill>
+                <a:latin typeface="Times New Roman" panose="02020603050405020304" pitchFamily="18" charset="0"/>
+                <a:cs typeface="Times New Roman" panose="02020603050405020304" pitchFamily="18" charset="0"/>
+              </a:rPr>
+              <a:t>BẢNG DỮ LIỆU</a:t>
+            </a:r>
+          </a:p>
+        </p:txBody>
+      </p:sp>
       <p:pic>
         <p:nvPicPr>
-          <p:cNvPr id="5" name="Picture 4">
+          <p:cNvPr id="7" name="Picture 6">
             <a:extLst>
               <a:ext uri="{FF2B5EF4-FFF2-40B4-BE49-F238E27FC236}">
-                <a16:creationId xmlns:a16="http://schemas.microsoft.com/office/drawing/2014/main" id="{1DBCD5B5-AD98-6342-B6BE-19233B4EFC9E}"/>
+                <a16:creationId xmlns:a16="http://schemas.microsoft.com/office/drawing/2014/main" id="{8224BE92-8AE2-4747-9870-D58C97B63575}"/>
               </a:ext>
             </a:extLst>
           </p:cNvPr>
@@ -7045,55 +7091,14 @@
         </p:blipFill>
         <p:spPr>
           <a:xfrm>
-            <a:off x="5136776" y="2213385"/>
-            <a:ext cx="5543084" cy="3291840"/>
+            <a:off x="5114430" y="2213385"/>
+            <a:ext cx="5525862" cy="3383851"/>
           </a:xfrm>
           <a:prstGeom prst="rect">
             <a:avLst/>
           </a:prstGeom>
         </p:spPr>
       </p:pic>
-      <p:sp>
-        <p:nvSpPr>
-          <p:cNvPr id="6" name="TextBox 5">
-            <a:extLst>
-              <a:ext uri="{FF2B5EF4-FFF2-40B4-BE49-F238E27FC236}">
-                <a16:creationId xmlns:a16="http://schemas.microsoft.com/office/drawing/2014/main" id="{27F84563-3F7C-6544-AEC1-5E08B22AE059}"/>
-              </a:ext>
-            </a:extLst>
-          </p:cNvPr>
-          <p:cNvSpPr txBox="1"/>
-          <p:nvPr/>
-        </p:nvSpPr>
-        <p:spPr>
-          <a:xfrm>
-            <a:off x="1451578" y="2213385"/>
-            <a:ext cx="3685197" cy="461665"/>
-          </a:xfrm>
-          <a:prstGeom prst="rect">
-            <a:avLst/>
-          </a:prstGeom>
-          <a:noFill/>
-        </p:spPr>
-        <p:txBody>
-          <a:bodyPr wrap="square" rtlCol="0">
-            <a:spAutoFit/>
-          </a:bodyPr>
-          <a:lstStyle/>
-          <a:p>
-            <a:r>
-              <a:rPr lang="en-US" sz="2400" b="1" dirty="0">
-                <a:solidFill>
-                  <a:srgbClr val="FF0000"/>
-                </a:solidFill>
-                <a:latin typeface="Times New Roman" panose="02020603050405020304" pitchFamily="18" charset="0"/>
-                <a:cs typeface="Times New Roman" panose="02020603050405020304" pitchFamily="18" charset="0"/>
-              </a:rPr>
-              <a:t>USE CASE HỆ THỐNG</a:t>
-            </a:r>
-          </a:p>
-        </p:txBody>
-      </p:sp>
     </p:spTree>
     <p:extLst>
       <p:ext uri="{BB962C8B-B14F-4D97-AF65-F5344CB8AC3E}">

</xml_diff>

<commit_message>
add file lan 3
</commit_message>
<xml_diff>
--- a/SlideThuyetTrinh.pptx
+++ b/SlideThuyetTrinh.pptx
@@ -6930,10 +6930,10 @@
       </p:sp>
       <p:pic>
         <p:nvPicPr>
-          <p:cNvPr id="6" name="Picture 5">
+          <p:cNvPr id="5" name="Picture 4">
             <a:extLst>
               <a:ext uri="{FF2B5EF4-FFF2-40B4-BE49-F238E27FC236}">
-                <a16:creationId xmlns:a16="http://schemas.microsoft.com/office/drawing/2014/main" id="{73D36004-7AAA-FD40-9653-059715BEB1EF}"/>
+                <a16:creationId xmlns:a16="http://schemas.microsoft.com/office/drawing/2014/main" id="{4C097E0B-60C4-C54B-AE83-4FA3A4666FD1}"/>
               </a:ext>
             </a:extLst>
           </p:cNvPr>
@@ -6954,8 +6954,8 @@
         </p:blipFill>
         <p:spPr>
           <a:xfrm>
-            <a:off x="5347854" y="2213385"/>
-            <a:ext cx="5332005" cy="3291840"/>
+            <a:off x="5144000" y="2366683"/>
+            <a:ext cx="5690255" cy="3284855"/>
           </a:xfrm>
           <a:prstGeom prst="rect">
             <a:avLst/>

</xml_diff>